<commit_message>
Finished touches on the LAPR3 report
</commit_message>
<xml_diff>
--- a/artifacts/LAPR3_Report_2NB_G322_sprint2.pptx
+++ b/artifacts/LAPR3_Report_2NB_G322_sprint2.pptx
@@ -218,7 +218,7 @@
               <a:cs typeface="+mn-cs"/>
             </a:defRPr>
           </a:pPr>
-          <a:endParaRPr lang="en-US"/>
+          <a:endParaRPr lang="en-PT"/>
         </a:p>
       </c:txPr>
     </c:title>
@@ -360,7 +360,7 @@
                 <a:cs typeface="+mn-cs"/>
               </a:defRPr>
             </a:pPr>
-            <a:endParaRPr lang="en-US"/>
+            <a:endParaRPr lang="en-PT"/>
           </a:p>
         </c:txPr>
         <c:crossAx val="691902368"/>
@@ -419,7 +419,7 @@
                 <a:cs typeface="+mn-cs"/>
               </a:defRPr>
             </a:pPr>
-            <a:endParaRPr lang="en-US"/>
+            <a:endParaRPr lang="en-PT"/>
           </a:p>
         </c:txPr>
         <c:crossAx val="691907944"/>
@@ -461,7 +461,7 @@
               <a:cs typeface="+mn-cs"/>
             </a:defRPr>
           </a:pPr>
-          <a:endParaRPr lang="en-US"/>
+          <a:endParaRPr lang="en-PT"/>
         </a:p>
       </c:txPr>
     </c:legend>
@@ -490,7 +490,7 @@
       <a:pPr>
         <a:defRPr/>
       </a:pPr>
-      <a:endParaRPr lang="en-US"/>
+      <a:endParaRPr lang="en-PT"/>
     </a:p>
   </c:txPr>
   <c:externalData r:id="rId3">
@@ -564,7 +564,7 @@
               <a:cs typeface="+mn-cs"/>
             </a:defRPr>
           </a:pPr>
-          <a:endParaRPr lang="en-US"/>
+          <a:endParaRPr lang="en-PT"/>
         </a:p>
       </c:txPr>
     </c:title>
@@ -796,7 +796,7 @@
               <a:cs typeface="+mn-cs"/>
             </a:defRPr>
           </a:pPr>
-          <a:endParaRPr lang="en-US"/>
+          <a:endParaRPr lang="en-PT"/>
         </a:p>
       </c:txPr>
     </c:legend>
@@ -825,7 +825,7 @@
       <a:pPr>
         <a:defRPr/>
       </a:pPr>
-      <a:endParaRPr lang="en-US"/>
+      <a:endParaRPr lang="en-PT"/>
     </a:p>
   </c:txPr>
   <c:externalData r:id="rId3">
@@ -2098,7 +2098,7 @@
             <a:fld id="{5D8AA918-AAAF-A948-AD9D-7282A6CA6554}" type="datetimeFigureOut">
               <a:rPr lang="en-US" smtClean="0"/>
               <a:pPr/>
-              <a:t>11/26/2023</a:t>
+              <a:t>11/26/23</a:t>
             </a:fld>
             <a:endParaRPr lang="pt-PT"/>
           </a:p>
@@ -2450,7 +2450,7 @@
             <a:fld id="{44B11A7A-C2E1-40A3-A304-BADFC0305F97}" type="datetimeFigureOut">
               <a:rPr lang="pt-PT" smtClean="0"/>
               <a:pPr/>
-              <a:t>26/11/2023</a:t>
+              <a:t>26/11/23</a:t>
             </a:fld>
             <a:endParaRPr lang="pt-PT"/>
           </a:p>
@@ -2716,7 +2716,7 @@
             <a:fld id="{44B11A7A-C2E1-40A3-A304-BADFC0305F97}" type="datetimeFigureOut">
               <a:rPr lang="pt-PT" smtClean="0"/>
               <a:pPr/>
-              <a:t>26/11/2023</a:t>
+              <a:t>26/11/23</a:t>
             </a:fld>
             <a:endParaRPr lang="pt-PT"/>
           </a:p>
@@ -2890,7 +2890,7 @@
             <a:fld id="{44B11A7A-C2E1-40A3-A304-BADFC0305F97}" type="datetimeFigureOut">
               <a:rPr lang="pt-PT" smtClean="0"/>
               <a:pPr/>
-              <a:t>26/11/2023</a:t>
+              <a:t>26/11/23</a:t>
             </a:fld>
             <a:endParaRPr lang="pt-PT"/>
           </a:p>
@@ -3100,7 +3100,7 @@
             <a:fld id="{44B11A7A-C2E1-40A3-A304-BADFC0305F97}" type="datetimeFigureOut">
               <a:rPr lang="pt-PT" smtClean="0"/>
               <a:pPr/>
-              <a:t>26/11/2023</a:t>
+              <a:t>26/11/23</a:t>
             </a:fld>
             <a:endParaRPr lang="pt-PT"/>
           </a:p>
@@ -3451,7 +3451,7 @@
             <a:fld id="{44B11A7A-C2E1-40A3-A304-BADFC0305F97}" type="datetimeFigureOut">
               <a:rPr lang="pt-PT" smtClean="0"/>
               <a:pPr/>
-              <a:t>26/11/2023</a:t>
+              <a:t>26/11/23</a:t>
             </a:fld>
             <a:endParaRPr lang="pt-PT"/>
           </a:p>
@@ -3546,7 +3546,7 @@
             <a:fld id="{44B11A7A-C2E1-40A3-A304-BADFC0305F97}" type="datetimeFigureOut">
               <a:rPr lang="pt-PT" smtClean="0"/>
               <a:pPr/>
-              <a:t>26/11/2023</a:t>
+              <a:t>26/11/23</a:t>
             </a:fld>
             <a:endParaRPr lang="pt-PT"/>
           </a:p>
@@ -3912,7 +3912,7 @@
             <a:fld id="{44B11A7A-C2E1-40A3-A304-BADFC0305F97}" type="datetimeFigureOut">
               <a:rPr lang="pt-PT" smtClean="0"/>
               <a:pPr/>
-              <a:t>26/11/2023</a:t>
+              <a:t>26/11/23</a:t>
             </a:fld>
             <a:endParaRPr lang="pt-PT"/>
           </a:p>
@@ -4037,7 +4037,7 @@
             <a:fld id="{44B11A7A-C2E1-40A3-A304-BADFC0305F97}" type="datetimeFigureOut">
               <a:rPr lang="pt-PT" smtClean="0"/>
               <a:pPr/>
-              <a:t>26/11/2023</a:t>
+              <a:t>26/11/23</a:t>
             </a:fld>
             <a:endParaRPr lang="pt-PT"/>
           </a:p>
@@ -4121,7 +4121,7 @@
             <a:fld id="{44B11A7A-C2E1-40A3-A304-BADFC0305F97}" type="datetimeFigureOut">
               <a:rPr lang="pt-PT" smtClean="0"/>
               <a:pPr/>
-              <a:t>26/11/2023</a:t>
+              <a:t>26/11/23</a:t>
             </a:fld>
             <a:endParaRPr lang="pt-PT"/>
           </a:p>
@@ -4998,6 +4998,51 @@
           </a:p>
         </p:txBody>
       </p:sp>
+      <p:pic>
+        <p:nvPicPr>
+          <p:cNvPr id="1026" name="Picture 2">
+            <a:extLst>
+              <a:ext uri="{FF2B5EF4-FFF2-40B4-BE49-F238E27FC236}">
+                <a16:creationId xmlns:a16="http://schemas.microsoft.com/office/drawing/2014/main" id="{7EF90892-BF3D-A933-1BAB-BA4BB034011F}"/>
+              </a:ext>
+            </a:extLst>
+          </p:cNvPr>
+          <p:cNvPicPr>
+            <a:picLocks noChangeAspect="1" noChangeArrowheads="1"/>
+          </p:cNvPicPr>
+          <p:nvPr/>
+        </p:nvPicPr>
+        <p:blipFill rotWithShape="1">
+          <a:blip r:embed="rId3">
+            <a:extLst>
+              <a:ext uri="{28A0092B-C50C-407E-A947-70E740481C1C}">
+                <a14:useLocalDpi xmlns:a14="http://schemas.microsoft.com/office/drawing/2010/main" val="0"/>
+              </a:ext>
+            </a:extLst>
+          </a:blip>
+          <a:srcRect b="34863"/>
+          <a:stretch/>
+        </p:blipFill>
+        <p:spPr bwMode="auto">
+          <a:xfrm>
+            <a:off x="1757645" y="1673805"/>
+            <a:ext cx="6390710" cy="4539201"/>
+          </a:xfrm>
+          <a:prstGeom prst="rect">
+            <a:avLst/>
+          </a:prstGeom>
+          <a:noFill/>
+          <a:extLst>
+            <a:ext uri="{909E8E84-426E-40DD-AFC4-6F175D3DCCD1}">
+              <a14:hiddenFill xmlns:a14="http://schemas.microsoft.com/office/drawing/2010/main">
+                <a:solidFill>
+                  <a:srgbClr val="FFFFFF"/>
+                </a:solidFill>
+              </a14:hiddenFill>
+            </a:ext>
+          </a:extLst>
+        </p:spPr>
+      </p:pic>
     </p:spTree>
     <p:extLst>
       <p:ext uri="{BB962C8B-B14F-4D97-AF65-F5344CB8AC3E}">
@@ -5697,7 +5742,7 @@
           <p:nvPr>
             <p:extLst>
               <p:ext uri="{D42A27DB-BD31-4B8C-83A1-F6EECF244321}">
-                <p14:modId xmlns:p14="http://schemas.microsoft.com/office/powerpoint/2010/main" val="899828338"/>
+                <p14:modId xmlns:p14="http://schemas.microsoft.com/office/powerpoint/2010/main" val="998096862"/>
               </p:ext>
             </p:extLst>
           </p:nvPr>
@@ -5987,7 +6032,7 @@
                             <a:srgbClr val="FF0000"/>
                           </a:solidFill>
                         </a:rPr>
-                        <a:t>216</a:t>
+                        <a:t>213</a:t>
                       </a:r>
                     </a:p>
                   </a:txBody>
@@ -6319,7 +6364,7 @@
           <p:nvPr>
             <p:extLst>
               <p:ext uri="{D42A27DB-BD31-4B8C-83A1-F6EECF244321}">
-                <p14:modId xmlns:p14="http://schemas.microsoft.com/office/powerpoint/2010/main" val="3588309379"/>
+                <p14:modId xmlns:p14="http://schemas.microsoft.com/office/powerpoint/2010/main" val="1251813217"/>
               </p:ext>
             </p:extLst>
           </p:nvPr>
@@ -6905,106 +6950,106 @@
                     <a:lstStyle/>
                     <a:p>
                       <a:pPr algn="ctr"/>
+                      <a:endParaRPr lang="pt-PT" dirty="0"/>
+                    </a:p>
+                  </a:txBody>
+                  <a:tcPr>
+                    <a:lnL w="12700" cap="flat" cmpd="sng" algn="ctr">
+                      <a:solidFill>
+                        <a:schemeClr val="tx1"/>
+                      </a:solidFill>
+                      <a:prstDash val="solid"/>
+                      <a:round/>
+                      <a:headEnd type="none" w="med" len="med"/>
+                      <a:tailEnd type="none" w="med" len="med"/>
+                    </a:lnL>
+                    <a:lnR w="12700" cap="flat" cmpd="sng" algn="ctr">
+                      <a:solidFill>
+                        <a:schemeClr val="tx1"/>
+                      </a:solidFill>
+                      <a:prstDash val="solid"/>
+                      <a:round/>
+                      <a:headEnd type="none" w="med" len="med"/>
+                      <a:tailEnd type="none" w="med" len="med"/>
+                    </a:lnR>
+                    <a:lnT w="12700" cap="flat" cmpd="sng" algn="ctr">
+                      <a:solidFill>
+                        <a:schemeClr val="tx1"/>
+                      </a:solidFill>
+                      <a:prstDash val="solid"/>
+                      <a:round/>
+                      <a:headEnd type="none" w="med" len="med"/>
+                      <a:tailEnd type="none" w="med" len="med"/>
+                    </a:lnT>
+                    <a:lnB w="12700" cap="flat" cmpd="sng" algn="ctr">
+                      <a:solidFill>
+                        <a:schemeClr val="tx1"/>
+                      </a:solidFill>
+                      <a:prstDash val="solid"/>
+                      <a:round/>
+                      <a:headEnd type="none" w="med" len="med"/>
+                      <a:tailEnd type="none" w="med" len="med"/>
+                    </a:lnB>
+                  </a:tcPr>
+                </a:tc>
+                <a:tc>
+                  <a:txBody>
+                    <a:bodyPr/>
+                    <a:lstStyle/>
+                    <a:p>
+                      <a:pPr algn="ctr"/>
+                      <a:endParaRPr lang="pt-PT"/>
+                    </a:p>
+                  </a:txBody>
+                  <a:tcPr>
+                    <a:lnL w="12700" cap="flat" cmpd="sng" algn="ctr">
+                      <a:solidFill>
+                        <a:schemeClr val="tx1"/>
+                      </a:solidFill>
+                      <a:prstDash val="solid"/>
+                      <a:round/>
+                      <a:headEnd type="none" w="med" len="med"/>
+                      <a:tailEnd type="none" w="med" len="med"/>
+                    </a:lnL>
+                    <a:lnR w="12700" cap="flat" cmpd="sng" algn="ctr">
+                      <a:solidFill>
+                        <a:schemeClr val="tx1"/>
+                      </a:solidFill>
+                      <a:prstDash val="solid"/>
+                      <a:round/>
+                      <a:headEnd type="none" w="med" len="med"/>
+                      <a:tailEnd type="none" w="med" len="med"/>
+                    </a:lnR>
+                    <a:lnT w="12700" cap="flat" cmpd="sng" algn="ctr">
+                      <a:solidFill>
+                        <a:schemeClr val="tx1"/>
+                      </a:solidFill>
+                      <a:prstDash val="solid"/>
+                      <a:round/>
+                      <a:headEnd type="none" w="med" len="med"/>
+                      <a:tailEnd type="none" w="med" len="med"/>
+                    </a:lnT>
+                    <a:lnB w="12700" cap="flat" cmpd="sng" algn="ctr">
+                      <a:solidFill>
+                        <a:schemeClr val="tx1"/>
+                      </a:solidFill>
+                      <a:prstDash val="solid"/>
+                      <a:round/>
+                      <a:headEnd type="none" w="med" len="med"/>
+                      <a:tailEnd type="none" w="med" len="med"/>
+                    </a:lnB>
+                  </a:tcPr>
+                </a:tc>
+                <a:tc>
+                  <a:txBody>
+                    <a:bodyPr/>
+                    <a:lstStyle/>
+                    <a:p>
+                      <a:pPr algn="ctr"/>
                       <a:r>
                         <a:rPr lang="pt-PT" dirty="0"/>
                         <a:t>X</a:t>
                       </a:r>
-                    </a:p>
-                  </a:txBody>
-                  <a:tcPr>
-                    <a:lnL w="12700" cap="flat" cmpd="sng" algn="ctr">
-                      <a:solidFill>
-                        <a:schemeClr val="tx1"/>
-                      </a:solidFill>
-                      <a:prstDash val="solid"/>
-                      <a:round/>
-                      <a:headEnd type="none" w="med" len="med"/>
-                      <a:tailEnd type="none" w="med" len="med"/>
-                    </a:lnL>
-                    <a:lnR w="12700" cap="flat" cmpd="sng" algn="ctr">
-                      <a:solidFill>
-                        <a:schemeClr val="tx1"/>
-                      </a:solidFill>
-                      <a:prstDash val="solid"/>
-                      <a:round/>
-                      <a:headEnd type="none" w="med" len="med"/>
-                      <a:tailEnd type="none" w="med" len="med"/>
-                    </a:lnR>
-                    <a:lnT w="12700" cap="flat" cmpd="sng" algn="ctr">
-                      <a:solidFill>
-                        <a:schemeClr val="tx1"/>
-                      </a:solidFill>
-                      <a:prstDash val="solid"/>
-                      <a:round/>
-                      <a:headEnd type="none" w="med" len="med"/>
-                      <a:tailEnd type="none" w="med" len="med"/>
-                    </a:lnT>
-                    <a:lnB w="12700" cap="flat" cmpd="sng" algn="ctr">
-                      <a:solidFill>
-                        <a:schemeClr val="tx1"/>
-                      </a:solidFill>
-                      <a:prstDash val="solid"/>
-                      <a:round/>
-                      <a:headEnd type="none" w="med" len="med"/>
-                      <a:tailEnd type="none" w="med" len="med"/>
-                    </a:lnB>
-                  </a:tcPr>
-                </a:tc>
-                <a:tc>
-                  <a:txBody>
-                    <a:bodyPr/>
-                    <a:lstStyle/>
-                    <a:p>
-                      <a:pPr algn="ctr"/>
-                      <a:endParaRPr lang="pt-PT"/>
-                    </a:p>
-                  </a:txBody>
-                  <a:tcPr>
-                    <a:lnL w="12700" cap="flat" cmpd="sng" algn="ctr">
-                      <a:solidFill>
-                        <a:schemeClr val="tx1"/>
-                      </a:solidFill>
-                      <a:prstDash val="solid"/>
-                      <a:round/>
-                      <a:headEnd type="none" w="med" len="med"/>
-                      <a:tailEnd type="none" w="med" len="med"/>
-                    </a:lnL>
-                    <a:lnR w="12700" cap="flat" cmpd="sng" algn="ctr">
-                      <a:solidFill>
-                        <a:schemeClr val="tx1"/>
-                      </a:solidFill>
-                      <a:prstDash val="solid"/>
-                      <a:round/>
-                      <a:headEnd type="none" w="med" len="med"/>
-                      <a:tailEnd type="none" w="med" len="med"/>
-                    </a:lnR>
-                    <a:lnT w="12700" cap="flat" cmpd="sng" algn="ctr">
-                      <a:solidFill>
-                        <a:schemeClr val="tx1"/>
-                      </a:solidFill>
-                      <a:prstDash val="solid"/>
-                      <a:round/>
-                      <a:headEnd type="none" w="med" len="med"/>
-                      <a:tailEnd type="none" w="med" len="med"/>
-                    </a:lnT>
-                    <a:lnB w="12700" cap="flat" cmpd="sng" algn="ctr">
-                      <a:solidFill>
-                        <a:schemeClr val="tx1"/>
-                      </a:solidFill>
-                      <a:prstDash val="solid"/>
-                      <a:round/>
-                      <a:headEnd type="none" w="med" len="med"/>
-                      <a:tailEnd type="none" w="med" len="med"/>
-                    </a:lnB>
-                  </a:tcPr>
-                </a:tc>
-                <a:tc>
-                  <a:txBody>
-                    <a:bodyPr/>
-                    <a:lstStyle/>
-                    <a:p>
-                      <a:pPr algn="ctr"/>
-                      <a:endParaRPr lang="pt-PT" dirty="0"/>
                     </a:p>
                   </a:txBody>
                   <a:tcPr>
@@ -9176,106 +9221,106 @@
                     <a:lstStyle/>
                     <a:p>
                       <a:pPr algn="ctr"/>
+                      <a:endParaRPr lang="pt-PT" dirty="0"/>
+                    </a:p>
+                  </a:txBody>
+                  <a:tcPr>
+                    <a:lnL w="12700" cap="flat" cmpd="sng" algn="ctr">
+                      <a:solidFill>
+                        <a:schemeClr val="tx1"/>
+                      </a:solidFill>
+                      <a:prstDash val="solid"/>
+                      <a:round/>
+                      <a:headEnd type="none" w="med" len="med"/>
+                      <a:tailEnd type="none" w="med" len="med"/>
+                    </a:lnL>
+                    <a:lnR w="12700" cap="flat" cmpd="sng" algn="ctr">
+                      <a:solidFill>
+                        <a:schemeClr val="tx1"/>
+                      </a:solidFill>
+                      <a:prstDash val="solid"/>
+                      <a:round/>
+                      <a:headEnd type="none" w="med" len="med"/>
+                      <a:tailEnd type="none" w="med" len="med"/>
+                    </a:lnR>
+                    <a:lnT w="12700" cap="flat" cmpd="sng" algn="ctr">
+                      <a:solidFill>
+                        <a:schemeClr val="tx1"/>
+                      </a:solidFill>
+                      <a:prstDash val="solid"/>
+                      <a:round/>
+                      <a:headEnd type="none" w="med" len="med"/>
+                      <a:tailEnd type="none" w="med" len="med"/>
+                    </a:lnT>
+                    <a:lnB w="12700" cap="flat" cmpd="sng" algn="ctr">
+                      <a:solidFill>
+                        <a:schemeClr val="tx1"/>
+                      </a:solidFill>
+                      <a:prstDash val="solid"/>
+                      <a:round/>
+                      <a:headEnd type="none" w="med" len="med"/>
+                      <a:tailEnd type="none" w="med" len="med"/>
+                    </a:lnB>
+                  </a:tcPr>
+                </a:tc>
+                <a:tc>
+                  <a:txBody>
+                    <a:bodyPr/>
+                    <a:lstStyle/>
+                    <a:p>
+                      <a:pPr algn="ctr"/>
+                      <a:endParaRPr lang="pt-PT"/>
+                    </a:p>
+                  </a:txBody>
+                  <a:tcPr>
+                    <a:lnL w="12700" cap="flat" cmpd="sng" algn="ctr">
+                      <a:solidFill>
+                        <a:schemeClr val="tx1"/>
+                      </a:solidFill>
+                      <a:prstDash val="solid"/>
+                      <a:round/>
+                      <a:headEnd type="none" w="med" len="med"/>
+                      <a:tailEnd type="none" w="med" len="med"/>
+                    </a:lnL>
+                    <a:lnR w="12700" cap="flat" cmpd="sng" algn="ctr">
+                      <a:solidFill>
+                        <a:schemeClr val="tx1"/>
+                      </a:solidFill>
+                      <a:prstDash val="solid"/>
+                      <a:round/>
+                      <a:headEnd type="none" w="med" len="med"/>
+                      <a:tailEnd type="none" w="med" len="med"/>
+                    </a:lnR>
+                    <a:lnT w="12700" cap="flat" cmpd="sng" algn="ctr">
+                      <a:solidFill>
+                        <a:schemeClr val="tx1"/>
+                      </a:solidFill>
+                      <a:prstDash val="solid"/>
+                      <a:round/>
+                      <a:headEnd type="none" w="med" len="med"/>
+                      <a:tailEnd type="none" w="med" len="med"/>
+                    </a:lnT>
+                    <a:lnB w="12700" cap="flat" cmpd="sng" algn="ctr">
+                      <a:solidFill>
+                        <a:schemeClr val="tx1"/>
+                      </a:solidFill>
+                      <a:prstDash val="solid"/>
+                      <a:round/>
+                      <a:headEnd type="none" w="med" len="med"/>
+                      <a:tailEnd type="none" w="med" len="med"/>
+                    </a:lnB>
+                  </a:tcPr>
+                </a:tc>
+                <a:tc>
+                  <a:txBody>
+                    <a:bodyPr/>
+                    <a:lstStyle/>
+                    <a:p>
+                      <a:pPr algn="ctr"/>
                       <a:r>
                         <a:rPr lang="pt-PT" dirty="0"/>
                         <a:t>X</a:t>
                       </a:r>
-                    </a:p>
-                  </a:txBody>
-                  <a:tcPr>
-                    <a:lnL w="12700" cap="flat" cmpd="sng" algn="ctr">
-                      <a:solidFill>
-                        <a:schemeClr val="tx1"/>
-                      </a:solidFill>
-                      <a:prstDash val="solid"/>
-                      <a:round/>
-                      <a:headEnd type="none" w="med" len="med"/>
-                      <a:tailEnd type="none" w="med" len="med"/>
-                    </a:lnL>
-                    <a:lnR w="12700" cap="flat" cmpd="sng" algn="ctr">
-                      <a:solidFill>
-                        <a:schemeClr val="tx1"/>
-                      </a:solidFill>
-                      <a:prstDash val="solid"/>
-                      <a:round/>
-                      <a:headEnd type="none" w="med" len="med"/>
-                      <a:tailEnd type="none" w="med" len="med"/>
-                    </a:lnR>
-                    <a:lnT w="12700" cap="flat" cmpd="sng" algn="ctr">
-                      <a:solidFill>
-                        <a:schemeClr val="tx1"/>
-                      </a:solidFill>
-                      <a:prstDash val="solid"/>
-                      <a:round/>
-                      <a:headEnd type="none" w="med" len="med"/>
-                      <a:tailEnd type="none" w="med" len="med"/>
-                    </a:lnT>
-                    <a:lnB w="12700" cap="flat" cmpd="sng" algn="ctr">
-                      <a:solidFill>
-                        <a:schemeClr val="tx1"/>
-                      </a:solidFill>
-                      <a:prstDash val="solid"/>
-                      <a:round/>
-                      <a:headEnd type="none" w="med" len="med"/>
-                      <a:tailEnd type="none" w="med" len="med"/>
-                    </a:lnB>
-                  </a:tcPr>
-                </a:tc>
-                <a:tc>
-                  <a:txBody>
-                    <a:bodyPr/>
-                    <a:lstStyle/>
-                    <a:p>
-                      <a:pPr algn="ctr"/>
-                      <a:endParaRPr lang="pt-PT"/>
-                    </a:p>
-                  </a:txBody>
-                  <a:tcPr>
-                    <a:lnL w="12700" cap="flat" cmpd="sng" algn="ctr">
-                      <a:solidFill>
-                        <a:schemeClr val="tx1"/>
-                      </a:solidFill>
-                      <a:prstDash val="solid"/>
-                      <a:round/>
-                      <a:headEnd type="none" w="med" len="med"/>
-                      <a:tailEnd type="none" w="med" len="med"/>
-                    </a:lnL>
-                    <a:lnR w="12700" cap="flat" cmpd="sng" algn="ctr">
-                      <a:solidFill>
-                        <a:schemeClr val="tx1"/>
-                      </a:solidFill>
-                      <a:prstDash val="solid"/>
-                      <a:round/>
-                      <a:headEnd type="none" w="med" len="med"/>
-                      <a:tailEnd type="none" w="med" len="med"/>
-                    </a:lnR>
-                    <a:lnT w="12700" cap="flat" cmpd="sng" algn="ctr">
-                      <a:solidFill>
-                        <a:schemeClr val="tx1"/>
-                      </a:solidFill>
-                      <a:prstDash val="solid"/>
-                      <a:round/>
-                      <a:headEnd type="none" w="med" len="med"/>
-                      <a:tailEnd type="none" w="med" len="med"/>
-                    </a:lnT>
-                    <a:lnB w="12700" cap="flat" cmpd="sng" algn="ctr">
-                      <a:solidFill>
-                        <a:schemeClr val="tx1"/>
-                      </a:solidFill>
-                      <a:prstDash val="solid"/>
-                      <a:round/>
-                      <a:headEnd type="none" w="med" len="med"/>
-                      <a:tailEnd type="none" w="med" len="med"/>
-                    </a:lnB>
-                  </a:tcPr>
-                </a:tc>
-                <a:tc>
-                  <a:txBody>
-                    <a:bodyPr/>
-                    <a:lstStyle/>
-                    <a:p>
-                      <a:pPr algn="ctr"/>
-                      <a:endParaRPr lang="pt-PT" dirty="0"/>
                     </a:p>
                   </a:txBody>
                   <a:tcPr>
@@ -9465,7 +9510,7 @@
           <p:nvPr>
             <p:extLst>
               <p:ext uri="{D42A27DB-BD31-4B8C-83A1-F6EECF244321}">
-                <p14:modId xmlns:p14="http://schemas.microsoft.com/office/powerpoint/2010/main" val="2053109308"/>
+                <p14:modId xmlns:p14="http://schemas.microsoft.com/office/powerpoint/2010/main" val="1621190365"/>
               </p:ext>
             </p:extLst>
           </p:nvPr>
@@ -14988,10 +15033,7 @@
                     <a:lstStyle/>
                     <a:p>
                       <a:pPr algn="ctr"/>
-                      <a:r>
-                        <a:rPr lang="pt-PT" sz="1400" dirty="0"/>
-                        <a:t>X</a:t>
-                      </a:r>
+                      <a:endParaRPr lang="pt-PT" sz="1400" dirty="0"/>
                     </a:p>
                   </a:txBody>
                   <a:tcPr>
@@ -15103,20 +15145,23 @@
                         <a:tabLst/>
                         <a:defRPr/>
                       </a:pPr>
-                      <a:endParaRPr kumimoji="0" lang="pt-PT" sz="1400" b="0" i="0" u="none" strike="noStrike" kern="1200" cap="none" spc="0" normalizeH="0" baseline="0" noProof="0" dirty="0">
-                        <a:ln>
-                          <a:noFill/>
-                        </a:ln>
-                        <a:solidFill>
-                          <a:prstClr val="black"/>
-                        </a:solidFill>
-                        <a:effectLst/>
-                        <a:uLnTx/>
-                        <a:uFillTx/>
-                        <a:latin typeface="Kozuka Gothic Pro R"/>
-                        <a:ea typeface="+mn-ea"/>
-                        <a:cs typeface="+mn-cs"/>
-                      </a:endParaRPr>
+                      <a:r>
+                        <a:rPr kumimoji="0" lang="pt-PT" sz="1400" b="0" i="0" u="none" strike="noStrike" kern="1200" cap="none" spc="0" normalizeH="0" baseline="0" noProof="0" dirty="0">
+                          <a:ln>
+                            <a:noFill/>
+                          </a:ln>
+                          <a:solidFill>
+                            <a:prstClr val="black"/>
+                          </a:solidFill>
+                          <a:effectLst/>
+                          <a:uLnTx/>
+                          <a:uFillTx/>
+                          <a:latin typeface="Kozuka Gothic Pro R"/>
+                          <a:ea typeface="+mn-ea"/>
+                          <a:cs typeface="+mn-cs"/>
+                        </a:rPr>
+                        <a:t>X</a:t>
+                      </a:r>
                     </a:p>
                   </a:txBody>
                   <a:tcPr>
@@ -15306,7 +15351,7 @@
           <p:nvPr>
             <p:extLst>
               <p:ext uri="{D42A27DB-BD31-4B8C-83A1-F6EECF244321}">
-                <p14:modId xmlns:p14="http://schemas.microsoft.com/office/powerpoint/2010/main" val="393544395"/>
+                <p14:modId xmlns:p14="http://schemas.microsoft.com/office/powerpoint/2010/main" val="2517786968"/>
               </p:ext>
             </p:extLst>
           </p:nvPr>
@@ -16287,106 +16332,106 @@
                     <a:lstStyle/>
                     <a:p>
                       <a:pPr algn="ctr"/>
+                      <a:endParaRPr lang="pt-PT" dirty="0"/>
+                    </a:p>
+                  </a:txBody>
+                  <a:tcPr>
+                    <a:lnL w="12700" cap="flat" cmpd="sng" algn="ctr">
+                      <a:solidFill>
+                        <a:schemeClr val="tx1"/>
+                      </a:solidFill>
+                      <a:prstDash val="solid"/>
+                      <a:round/>
+                      <a:headEnd type="none" w="med" len="med"/>
+                      <a:tailEnd type="none" w="med" len="med"/>
+                    </a:lnL>
+                    <a:lnR w="12700" cap="flat" cmpd="sng" algn="ctr">
+                      <a:solidFill>
+                        <a:schemeClr val="tx1"/>
+                      </a:solidFill>
+                      <a:prstDash val="solid"/>
+                      <a:round/>
+                      <a:headEnd type="none" w="med" len="med"/>
+                      <a:tailEnd type="none" w="med" len="med"/>
+                    </a:lnR>
+                    <a:lnT w="12700" cap="flat" cmpd="sng" algn="ctr">
+                      <a:solidFill>
+                        <a:schemeClr val="tx1"/>
+                      </a:solidFill>
+                      <a:prstDash val="solid"/>
+                      <a:round/>
+                      <a:headEnd type="none" w="med" len="med"/>
+                      <a:tailEnd type="none" w="med" len="med"/>
+                    </a:lnT>
+                    <a:lnB w="12700" cap="flat" cmpd="sng" algn="ctr">
+                      <a:solidFill>
+                        <a:schemeClr val="tx1"/>
+                      </a:solidFill>
+                      <a:prstDash val="solid"/>
+                      <a:round/>
+                      <a:headEnd type="none" w="med" len="med"/>
+                      <a:tailEnd type="none" w="med" len="med"/>
+                    </a:lnB>
+                  </a:tcPr>
+                </a:tc>
+                <a:tc>
+                  <a:txBody>
+                    <a:bodyPr/>
+                    <a:lstStyle/>
+                    <a:p>
+                      <a:pPr algn="ctr"/>
+                      <a:endParaRPr lang="pt-PT"/>
+                    </a:p>
+                  </a:txBody>
+                  <a:tcPr>
+                    <a:lnL w="12700" cap="flat" cmpd="sng" algn="ctr">
+                      <a:solidFill>
+                        <a:schemeClr val="tx1"/>
+                      </a:solidFill>
+                      <a:prstDash val="solid"/>
+                      <a:round/>
+                      <a:headEnd type="none" w="med" len="med"/>
+                      <a:tailEnd type="none" w="med" len="med"/>
+                    </a:lnL>
+                    <a:lnR w="12700" cap="flat" cmpd="sng" algn="ctr">
+                      <a:solidFill>
+                        <a:schemeClr val="tx1"/>
+                      </a:solidFill>
+                      <a:prstDash val="solid"/>
+                      <a:round/>
+                      <a:headEnd type="none" w="med" len="med"/>
+                      <a:tailEnd type="none" w="med" len="med"/>
+                    </a:lnR>
+                    <a:lnT w="12700" cap="flat" cmpd="sng" algn="ctr">
+                      <a:solidFill>
+                        <a:schemeClr val="tx1"/>
+                      </a:solidFill>
+                      <a:prstDash val="solid"/>
+                      <a:round/>
+                      <a:headEnd type="none" w="med" len="med"/>
+                      <a:tailEnd type="none" w="med" len="med"/>
+                    </a:lnT>
+                    <a:lnB w="12700" cap="flat" cmpd="sng" algn="ctr">
+                      <a:solidFill>
+                        <a:schemeClr val="tx1"/>
+                      </a:solidFill>
+                      <a:prstDash val="solid"/>
+                      <a:round/>
+                      <a:headEnd type="none" w="med" len="med"/>
+                      <a:tailEnd type="none" w="med" len="med"/>
+                    </a:lnB>
+                  </a:tcPr>
+                </a:tc>
+                <a:tc>
+                  <a:txBody>
+                    <a:bodyPr/>
+                    <a:lstStyle/>
+                    <a:p>
+                      <a:pPr algn="ctr"/>
                       <a:r>
                         <a:rPr lang="pt-PT" dirty="0"/>
                         <a:t>X</a:t>
                       </a:r>
-                    </a:p>
-                  </a:txBody>
-                  <a:tcPr>
-                    <a:lnL w="12700" cap="flat" cmpd="sng" algn="ctr">
-                      <a:solidFill>
-                        <a:schemeClr val="tx1"/>
-                      </a:solidFill>
-                      <a:prstDash val="solid"/>
-                      <a:round/>
-                      <a:headEnd type="none" w="med" len="med"/>
-                      <a:tailEnd type="none" w="med" len="med"/>
-                    </a:lnL>
-                    <a:lnR w="12700" cap="flat" cmpd="sng" algn="ctr">
-                      <a:solidFill>
-                        <a:schemeClr val="tx1"/>
-                      </a:solidFill>
-                      <a:prstDash val="solid"/>
-                      <a:round/>
-                      <a:headEnd type="none" w="med" len="med"/>
-                      <a:tailEnd type="none" w="med" len="med"/>
-                    </a:lnR>
-                    <a:lnT w="12700" cap="flat" cmpd="sng" algn="ctr">
-                      <a:solidFill>
-                        <a:schemeClr val="tx1"/>
-                      </a:solidFill>
-                      <a:prstDash val="solid"/>
-                      <a:round/>
-                      <a:headEnd type="none" w="med" len="med"/>
-                      <a:tailEnd type="none" w="med" len="med"/>
-                    </a:lnT>
-                    <a:lnB w="12700" cap="flat" cmpd="sng" algn="ctr">
-                      <a:solidFill>
-                        <a:schemeClr val="tx1"/>
-                      </a:solidFill>
-                      <a:prstDash val="solid"/>
-                      <a:round/>
-                      <a:headEnd type="none" w="med" len="med"/>
-                      <a:tailEnd type="none" w="med" len="med"/>
-                    </a:lnB>
-                  </a:tcPr>
-                </a:tc>
-                <a:tc>
-                  <a:txBody>
-                    <a:bodyPr/>
-                    <a:lstStyle/>
-                    <a:p>
-                      <a:pPr algn="ctr"/>
-                      <a:endParaRPr lang="pt-PT"/>
-                    </a:p>
-                  </a:txBody>
-                  <a:tcPr>
-                    <a:lnL w="12700" cap="flat" cmpd="sng" algn="ctr">
-                      <a:solidFill>
-                        <a:schemeClr val="tx1"/>
-                      </a:solidFill>
-                      <a:prstDash val="solid"/>
-                      <a:round/>
-                      <a:headEnd type="none" w="med" len="med"/>
-                      <a:tailEnd type="none" w="med" len="med"/>
-                    </a:lnL>
-                    <a:lnR w="12700" cap="flat" cmpd="sng" algn="ctr">
-                      <a:solidFill>
-                        <a:schemeClr val="tx1"/>
-                      </a:solidFill>
-                      <a:prstDash val="solid"/>
-                      <a:round/>
-                      <a:headEnd type="none" w="med" len="med"/>
-                      <a:tailEnd type="none" w="med" len="med"/>
-                    </a:lnR>
-                    <a:lnT w="12700" cap="flat" cmpd="sng" algn="ctr">
-                      <a:solidFill>
-                        <a:schemeClr val="tx1"/>
-                      </a:solidFill>
-                      <a:prstDash val="solid"/>
-                      <a:round/>
-                      <a:headEnd type="none" w="med" len="med"/>
-                      <a:tailEnd type="none" w="med" len="med"/>
-                    </a:lnT>
-                    <a:lnB w="12700" cap="flat" cmpd="sng" algn="ctr">
-                      <a:solidFill>
-                        <a:schemeClr val="tx1"/>
-                      </a:solidFill>
-                      <a:prstDash val="solid"/>
-                      <a:round/>
-                      <a:headEnd type="none" w="med" len="med"/>
-                      <a:tailEnd type="none" w="med" len="med"/>
-                    </a:lnB>
-                  </a:tcPr>
-                </a:tc>
-                <a:tc>
-                  <a:txBody>
-                    <a:bodyPr/>
-                    <a:lstStyle/>
-                    <a:p>
-                      <a:pPr algn="ctr"/>
-                      <a:endParaRPr lang="pt-PT" dirty="0"/>
                     </a:p>
                   </a:txBody>
                   <a:tcPr>
@@ -17809,7 +17854,7 @@
           <p:nvPr>
             <p:extLst>
               <p:ext uri="{D42A27DB-BD31-4B8C-83A1-F6EECF244321}">
-                <p14:modId xmlns:p14="http://schemas.microsoft.com/office/powerpoint/2010/main" val="3279695941"/>
+                <p14:modId xmlns:p14="http://schemas.microsoft.com/office/powerpoint/2010/main" val="703103747"/>
               </p:ext>
             </p:extLst>
           </p:nvPr>
@@ -19612,106 +19657,106 @@
                     <a:lstStyle/>
                     <a:p>
                       <a:pPr algn="ctr"/>
+                      <a:endParaRPr lang="pt-PT" dirty="0"/>
+                    </a:p>
+                  </a:txBody>
+                  <a:tcPr>
+                    <a:lnL w="12700" cap="flat" cmpd="sng" algn="ctr">
+                      <a:solidFill>
+                        <a:schemeClr val="tx1"/>
+                      </a:solidFill>
+                      <a:prstDash val="solid"/>
+                      <a:round/>
+                      <a:headEnd type="none" w="med" len="med"/>
+                      <a:tailEnd type="none" w="med" len="med"/>
+                    </a:lnL>
+                    <a:lnR w="12700" cap="flat" cmpd="sng" algn="ctr">
+                      <a:solidFill>
+                        <a:schemeClr val="tx1"/>
+                      </a:solidFill>
+                      <a:prstDash val="solid"/>
+                      <a:round/>
+                      <a:headEnd type="none" w="med" len="med"/>
+                      <a:tailEnd type="none" w="med" len="med"/>
+                    </a:lnR>
+                    <a:lnT w="12700" cap="flat" cmpd="sng" algn="ctr">
+                      <a:solidFill>
+                        <a:schemeClr val="tx1"/>
+                      </a:solidFill>
+                      <a:prstDash val="solid"/>
+                      <a:round/>
+                      <a:headEnd type="none" w="med" len="med"/>
+                      <a:tailEnd type="none" w="med" len="med"/>
+                    </a:lnT>
+                    <a:lnB w="12700" cap="flat" cmpd="sng" algn="ctr">
+                      <a:solidFill>
+                        <a:schemeClr val="tx1"/>
+                      </a:solidFill>
+                      <a:prstDash val="solid"/>
+                      <a:round/>
+                      <a:headEnd type="none" w="med" len="med"/>
+                      <a:tailEnd type="none" w="med" len="med"/>
+                    </a:lnB>
+                  </a:tcPr>
+                </a:tc>
+                <a:tc>
+                  <a:txBody>
+                    <a:bodyPr/>
+                    <a:lstStyle/>
+                    <a:p>
+                      <a:pPr algn="ctr"/>
+                      <a:endParaRPr lang="pt-PT"/>
+                    </a:p>
+                  </a:txBody>
+                  <a:tcPr>
+                    <a:lnL w="12700" cap="flat" cmpd="sng" algn="ctr">
+                      <a:solidFill>
+                        <a:schemeClr val="tx1"/>
+                      </a:solidFill>
+                      <a:prstDash val="solid"/>
+                      <a:round/>
+                      <a:headEnd type="none" w="med" len="med"/>
+                      <a:tailEnd type="none" w="med" len="med"/>
+                    </a:lnL>
+                    <a:lnR w="12700" cap="flat" cmpd="sng" algn="ctr">
+                      <a:solidFill>
+                        <a:schemeClr val="tx1"/>
+                      </a:solidFill>
+                      <a:prstDash val="solid"/>
+                      <a:round/>
+                      <a:headEnd type="none" w="med" len="med"/>
+                      <a:tailEnd type="none" w="med" len="med"/>
+                    </a:lnR>
+                    <a:lnT w="12700" cap="flat" cmpd="sng" algn="ctr">
+                      <a:solidFill>
+                        <a:schemeClr val="tx1"/>
+                      </a:solidFill>
+                      <a:prstDash val="solid"/>
+                      <a:round/>
+                      <a:headEnd type="none" w="med" len="med"/>
+                      <a:tailEnd type="none" w="med" len="med"/>
+                    </a:lnT>
+                    <a:lnB w="12700" cap="flat" cmpd="sng" algn="ctr">
+                      <a:solidFill>
+                        <a:schemeClr val="tx1"/>
+                      </a:solidFill>
+                      <a:prstDash val="solid"/>
+                      <a:round/>
+                      <a:headEnd type="none" w="med" len="med"/>
+                      <a:tailEnd type="none" w="med" len="med"/>
+                    </a:lnB>
+                  </a:tcPr>
+                </a:tc>
+                <a:tc>
+                  <a:txBody>
+                    <a:bodyPr/>
+                    <a:lstStyle/>
+                    <a:p>
+                      <a:pPr algn="ctr"/>
                       <a:r>
                         <a:rPr lang="pt-PT" dirty="0"/>
                         <a:t>X</a:t>
                       </a:r>
-                    </a:p>
-                  </a:txBody>
-                  <a:tcPr>
-                    <a:lnL w="12700" cap="flat" cmpd="sng" algn="ctr">
-                      <a:solidFill>
-                        <a:schemeClr val="tx1"/>
-                      </a:solidFill>
-                      <a:prstDash val="solid"/>
-                      <a:round/>
-                      <a:headEnd type="none" w="med" len="med"/>
-                      <a:tailEnd type="none" w="med" len="med"/>
-                    </a:lnL>
-                    <a:lnR w="12700" cap="flat" cmpd="sng" algn="ctr">
-                      <a:solidFill>
-                        <a:schemeClr val="tx1"/>
-                      </a:solidFill>
-                      <a:prstDash val="solid"/>
-                      <a:round/>
-                      <a:headEnd type="none" w="med" len="med"/>
-                      <a:tailEnd type="none" w="med" len="med"/>
-                    </a:lnR>
-                    <a:lnT w="12700" cap="flat" cmpd="sng" algn="ctr">
-                      <a:solidFill>
-                        <a:schemeClr val="tx1"/>
-                      </a:solidFill>
-                      <a:prstDash val="solid"/>
-                      <a:round/>
-                      <a:headEnd type="none" w="med" len="med"/>
-                      <a:tailEnd type="none" w="med" len="med"/>
-                    </a:lnT>
-                    <a:lnB w="12700" cap="flat" cmpd="sng" algn="ctr">
-                      <a:solidFill>
-                        <a:schemeClr val="tx1"/>
-                      </a:solidFill>
-                      <a:prstDash val="solid"/>
-                      <a:round/>
-                      <a:headEnd type="none" w="med" len="med"/>
-                      <a:tailEnd type="none" w="med" len="med"/>
-                    </a:lnB>
-                  </a:tcPr>
-                </a:tc>
-                <a:tc>
-                  <a:txBody>
-                    <a:bodyPr/>
-                    <a:lstStyle/>
-                    <a:p>
-                      <a:pPr algn="ctr"/>
-                      <a:endParaRPr lang="pt-PT"/>
-                    </a:p>
-                  </a:txBody>
-                  <a:tcPr>
-                    <a:lnL w="12700" cap="flat" cmpd="sng" algn="ctr">
-                      <a:solidFill>
-                        <a:schemeClr val="tx1"/>
-                      </a:solidFill>
-                      <a:prstDash val="solid"/>
-                      <a:round/>
-                      <a:headEnd type="none" w="med" len="med"/>
-                      <a:tailEnd type="none" w="med" len="med"/>
-                    </a:lnL>
-                    <a:lnR w="12700" cap="flat" cmpd="sng" algn="ctr">
-                      <a:solidFill>
-                        <a:schemeClr val="tx1"/>
-                      </a:solidFill>
-                      <a:prstDash val="solid"/>
-                      <a:round/>
-                      <a:headEnd type="none" w="med" len="med"/>
-                      <a:tailEnd type="none" w="med" len="med"/>
-                    </a:lnR>
-                    <a:lnT w="12700" cap="flat" cmpd="sng" algn="ctr">
-                      <a:solidFill>
-                        <a:schemeClr val="tx1"/>
-                      </a:solidFill>
-                      <a:prstDash val="solid"/>
-                      <a:round/>
-                      <a:headEnd type="none" w="med" len="med"/>
-                      <a:tailEnd type="none" w="med" len="med"/>
-                    </a:lnT>
-                    <a:lnB w="12700" cap="flat" cmpd="sng" algn="ctr">
-                      <a:solidFill>
-                        <a:schemeClr val="tx1"/>
-                      </a:solidFill>
-                      <a:prstDash val="solid"/>
-                      <a:round/>
-                      <a:headEnd type="none" w="med" len="med"/>
-                      <a:tailEnd type="none" w="med" len="med"/>
-                    </a:lnB>
-                  </a:tcPr>
-                </a:tc>
-                <a:tc>
-                  <a:txBody>
-                    <a:bodyPr/>
-                    <a:lstStyle/>
-                    <a:p>
-                      <a:pPr algn="ctr"/>
-                      <a:endParaRPr lang="pt-PT" dirty="0"/>
                     </a:p>
                   </a:txBody>
                   <a:tcPr>
@@ -19901,7 +19946,7 @@
           <p:nvPr>
             <p:extLst>
               <p:ext uri="{D42A27DB-BD31-4B8C-83A1-F6EECF244321}">
-                <p14:modId xmlns:p14="http://schemas.microsoft.com/office/powerpoint/2010/main" val="1680428354"/>
+                <p14:modId xmlns:p14="http://schemas.microsoft.com/office/powerpoint/2010/main" val="1153951991"/>
               </p:ext>
             </p:extLst>
           </p:nvPr>
@@ -20898,106 +20943,106 @@
                     <a:lstStyle/>
                     <a:p>
                       <a:pPr algn="ctr"/>
+                      <a:endParaRPr lang="pt-PT" dirty="0"/>
+                    </a:p>
+                  </a:txBody>
+                  <a:tcPr>
+                    <a:lnL w="12700" cap="flat" cmpd="sng" algn="ctr">
+                      <a:solidFill>
+                        <a:schemeClr val="tx1"/>
+                      </a:solidFill>
+                      <a:prstDash val="solid"/>
+                      <a:round/>
+                      <a:headEnd type="none" w="med" len="med"/>
+                      <a:tailEnd type="none" w="med" len="med"/>
+                    </a:lnL>
+                    <a:lnR w="12700" cap="flat" cmpd="sng" algn="ctr">
+                      <a:solidFill>
+                        <a:schemeClr val="tx1"/>
+                      </a:solidFill>
+                      <a:prstDash val="solid"/>
+                      <a:round/>
+                      <a:headEnd type="none" w="med" len="med"/>
+                      <a:tailEnd type="none" w="med" len="med"/>
+                    </a:lnR>
+                    <a:lnT w="12700" cap="flat" cmpd="sng" algn="ctr">
+                      <a:solidFill>
+                        <a:schemeClr val="tx1"/>
+                      </a:solidFill>
+                      <a:prstDash val="solid"/>
+                      <a:round/>
+                      <a:headEnd type="none" w="med" len="med"/>
+                      <a:tailEnd type="none" w="med" len="med"/>
+                    </a:lnT>
+                    <a:lnB w="12700" cap="flat" cmpd="sng" algn="ctr">
+                      <a:solidFill>
+                        <a:schemeClr val="tx1"/>
+                      </a:solidFill>
+                      <a:prstDash val="solid"/>
+                      <a:round/>
+                      <a:headEnd type="none" w="med" len="med"/>
+                      <a:tailEnd type="none" w="med" len="med"/>
+                    </a:lnB>
+                  </a:tcPr>
+                </a:tc>
+                <a:tc>
+                  <a:txBody>
+                    <a:bodyPr/>
+                    <a:lstStyle/>
+                    <a:p>
+                      <a:pPr algn="ctr"/>
+                      <a:endParaRPr lang="pt-PT"/>
+                    </a:p>
+                  </a:txBody>
+                  <a:tcPr>
+                    <a:lnL w="12700" cap="flat" cmpd="sng" algn="ctr">
+                      <a:solidFill>
+                        <a:schemeClr val="tx1"/>
+                      </a:solidFill>
+                      <a:prstDash val="solid"/>
+                      <a:round/>
+                      <a:headEnd type="none" w="med" len="med"/>
+                      <a:tailEnd type="none" w="med" len="med"/>
+                    </a:lnL>
+                    <a:lnR w="12700" cap="flat" cmpd="sng" algn="ctr">
+                      <a:solidFill>
+                        <a:schemeClr val="tx1"/>
+                      </a:solidFill>
+                      <a:prstDash val="solid"/>
+                      <a:round/>
+                      <a:headEnd type="none" w="med" len="med"/>
+                      <a:tailEnd type="none" w="med" len="med"/>
+                    </a:lnR>
+                    <a:lnT w="12700" cap="flat" cmpd="sng" algn="ctr">
+                      <a:solidFill>
+                        <a:schemeClr val="tx1"/>
+                      </a:solidFill>
+                      <a:prstDash val="solid"/>
+                      <a:round/>
+                      <a:headEnd type="none" w="med" len="med"/>
+                      <a:tailEnd type="none" w="med" len="med"/>
+                    </a:lnT>
+                    <a:lnB w="12700" cap="flat" cmpd="sng" algn="ctr">
+                      <a:solidFill>
+                        <a:schemeClr val="tx1"/>
+                      </a:solidFill>
+                      <a:prstDash val="solid"/>
+                      <a:round/>
+                      <a:headEnd type="none" w="med" len="med"/>
+                      <a:tailEnd type="none" w="med" len="med"/>
+                    </a:lnB>
+                  </a:tcPr>
+                </a:tc>
+                <a:tc>
+                  <a:txBody>
+                    <a:bodyPr/>
+                    <a:lstStyle/>
+                    <a:p>
+                      <a:pPr algn="ctr"/>
                       <a:r>
                         <a:rPr lang="pt-PT" dirty="0"/>
                         <a:t>X</a:t>
                       </a:r>
-                    </a:p>
-                  </a:txBody>
-                  <a:tcPr>
-                    <a:lnL w="12700" cap="flat" cmpd="sng" algn="ctr">
-                      <a:solidFill>
-                        <a:schemeClr val="tx1"/>
-                      </a:solidFill>
-                      <a:prstDash val="solid"/>
-                      <a:round/>
-                      <a:headEnd type="none" w="med" len="med"/>
-                      <a:tailEnd type="none" w="med" len="med"/>
-                    </a:lnL>
-                    <a:lnR w="12700" cap="flat" cmpd="sng" algn="ctr">
-                      <a:solidFill>
-                        <a:schemeClr val="tx1"/>
-                      </a:solidFill>
-                      <a:prstDash val="solid"/>
-                      <a:round/>
-                      <a:headEnd type="none" w="med" len="med"/>
-                      <a:tailEnd type="none" w="med" len="med"/>
-                    </a:lnR>
-                    <a:lnT w="12700" cap="flat" cmpd="sng" algn="ctr">
-                      <a:solidFill>
-                        <a:schemeClr val="tx1"/>
-                      </a:solidFill>
-                      <a:prstDash val="solid"/>
-                      <a:round/>
-                      <a:headEnd type="none" w="med" len="med"/>
-                      <a:tailEnd type="none" w="med" len="med"/>
-                    </a:lnT>
-                    <a:lnB w="12700" cap="flat" cmpd="sng" algn="ctr">
-                      <a:solidFill>
-                        <a:schemeClr val="tx1"/>
-                      </a:solidFill>
-                      <a:prstDash val="solid"/>
-                      <a:round/>
-                      <a:headEnd type="none" w="med" len="med"/>
-                      <a:tailEnd type="none" w="med" len="med"/>
-                    </a:lnB>
-                  </a:tcPr>
-                </a:tc>
-                <a:tc>
-                  <a:txBody>
-                    <a:bodyPr/>
-                    <a:lstStyle/>
-                    <a:p>
-                      <a:pPr algn="ctr"/>
-                      <a:endParaRPr lang="pt-PT"/>
-                    </a:p>
-                  </a:txBody>
-                  <a:tcPr>
-                    <a:lnL w="12700" cap="flat" cmpd="sng" algn="ctr">
-                      <a:solidFill>
-                        <a:schemeClr val="tx1"/>
-                      </a:solidFill>
-                      <a:prstDash val="solid"/>
-                      <a:round/>
-                      <a:headEnd type="none" w="med" len="med"/>
-                      <a:tailEnd type="none" w="med" len="med"/>
-                    </a:lnL>
-                    <a:lnR w="12700" cap="flat" cmpd="sng" algn="ctr">
-                      <a:solidFill>
-                        <a:schemeClr val="tx1"/>
-                      </a:solidFill>
-                      <a:prstDash val="solid"/>
-                      <a:round/>
-                      <a:headEnd type="none" w="med" len="med"/>
-                      <a:tailEnd type="none" w="med" len="med"/>
-                    </a:lnR>
-                    <a:lnT w="12700" cap="flat" cmpd="sng" algn="ctr">
-                      <a:solidFill>
-                        <a:schemeClr val="tx1"/>
-                      </a:solidFill>
-                      <a:prstDash val="solid"/>
-                      <a:round/>
-                      <a:headEnd type="none" w="med" len="med"/>
-                      <a:tailEnd type="none" w="med" len="med"/>
-                    </a:lnT>
-                    <a:lnB w="12700" cap="flat" cmpd="sng" algn="ctr">
-                      <a:solidFill>
-                        <a:schemeClr val="tx1"/>
-                      </a:solidFill>
-                      <a:prstDash val="solid"/>
-                      <a:round/>
-                      <a:headEnd type="none" w="med" len="med"/>
-                      <a:tailEnd type="none" w="med" len="med"/>
-                    </a:lnB>
-                  </a:tcPr>
-                </a:tc>
-                <a:tc>
-                  <a:txBody>
-                    <a:bodyPr/>
-                    <a:lstStyle/>
-                    <a:p>
-                      <a:pPr algn="ctr"/>
-                      <a:endParaRPr lang="pt-PT" dirty="0"/>
                     </a:p>
                   </a:txBody>
                   <a:tcPr>
@@ -21704,106 +21749,106 @@
                     <a:lstStyle/>
                     <a:p>
                       <a:pPr algn="ctr"/>
+                      <a:endParaRPr lang="pt-PT" dirty="0"/>
+                    </a:p>
+                  </a:txBody>
+                  <a:tcPr>
+                    <a:lnL w="12700" cap="flat" cmpd="sng" algn="ctr">
+                      <a:solidFill>
+                        <a:schemeClr val="tx1"/>
+                      </a:solidFill>
+                      <a:prstDash val="solid"/>
+                      <a:round/>
+                      <a:headEnd type="none" w="med" len="med"/>
+                      <a:tailEnd type="none" w="med" len="med"/>
+                    </a:lnL>
+                    <a:lnR w="12700" cap="flat" cmpd="sng" algn="ctr">
+                      <a:solidFill>
+                        <a:schemeClr val="tx1"/>
+                      </a:solidFill>
+                      <a:prstDash val="solid"/>
+                      <a:round/>
+                      <a:headEnd type="none" w="med" len="med"/>
+                      <a:tailEnd type="none" w="med" len="med"/>
+                    </a:lnR>
+                    <a:lnT w="12700" cap="flat" cmpd="sng" algn="ctr">
+                      <a:solidFill>
+                        <a:schemeClr val="tx1"/>
+                      </a:solidFill>
+                      <a:prstDash val="solid"/>
+                      <a:round/>
+                      <a:headEnd type="none" w="med" len="med"/>
+                      <a:tailEnd type="none" w="med" len="med"/>
+                    </a:lnT>
+                    <a:lnB w="12700" cap="flat" cmpd="sng" algn="ctr">
+                      <a:solidFill>
+                        <a:schemeClr val="tx1"/>
+                      </a:solidFill>
+                      <a:prstDash val="solid"/>
+                      <a:round/>
+                      <a:headEnd type="none" w="med" len="med"/>
+                      <a:tailEnd type="none" w="med" len="med"/>
+                    </a:lnB>
+                  </a:tcPr>
+                </a:tc>
+                <a:tc>
+                  <a:txBody>
+                    <a:bodyPr/>
+                    <a:lstStyle/>
+                    <a:p>
+                      <a:pPr algn="ctr"/>
+                      <a:endParaRPr lang="pt-PT"/>
+                    </a:p>
+                  </a:txBody>
+                  <a:tcPr>
+                    <a:lnL w="12700" cap="flat" cmpd="sng" algn="ctr">
+                      <a:solidFill>
+                        <a:schemeClr val="tx1"/>
+                      </a:solidFill>
+                      <a:prstDash val="solid"/>
+                      <a:round/>
+                      <a:headEnd type="none" w="med" len="med"/>
+                      <a:tailEnd type="none" w="med" len="med"/>
+                    </a:lnL>
+                    <a:lnR w="12700" cap="flat" cmpd="sng" algn="ctr">
+                      <a:solidFill>
+                        <a:schemeClr val="tx1"/>
+                      </a:solidFill>
+                      <a:prstDash val="solid"/>
+                      <a:round/>
+                      <a:headEnd type="none" w="med" len="med"/>
+                      <a:tailEnd type="none" w="med" len="med"/>
+                    </a:lnR>
+                    <a:lnT w="12700" cap="flat" cmpd="sng" algn="ctr">
+                      <a:solidFill>
+                        <a:schemeClr val="tx1"/>
+                      </a:solidFill>
+                      <a:prstDash val="solid"/>
+                      <a:round/>
+                      <a:headEnd type="none" w="med" len="med"/>
+                      <a:tailEnd type="none" w="med" len="med"/>
+                    </a:lnT>
+                    <a:lnB w="12700" cap="flat" cmpd="sng" algn="ctr">
+                      <a:solidFill>
+                        <a:schemeClr val="tx1"/>
+                      </a:solidFill>
+                      <a:prstDash val="solid"/>
+                      <a:round/>
+                      <a:headEnd type="none" w="med" len="med"/>
+                      <a:tailEnd type="none" w="med" len="med"/>
+                    </a:lnB>
+                  </a:tcPr>
+                </a:tc>
+                <a:tc>
+                  <a:txBody>
+                    <a:bodyPr/>
+                    <a:lstStyle/>
+                    <a:p>
+                      <a:pPr algn="ctr"/>
                       <a:r>
                         <a:rPr lang="pt-PT" dirty="0"/>
                         <a:t>X</a:t>
                       </a:r>
-                    </a:p>
-                  </a:txBody>
-                  <a:tcPr>
-                    <a:lnL w="12700" cap="flat" cmpd="sng" algn="ctr">
-                      <a:solidFill>
-                        <a:schemeClr val="tx1"/>
-                      </a:solidFill>
-                      <a:prstDash val="solid"/>
-                      <a:round/>
-                      <a:headEnd type="none" w="med" len="med"/>
-                      <a:tailEnd type="none" w="med" len="med"/>
-                    </a:lnL>
-                    <a:lnR w="12700" cap="flat" cmpd="sng" algn="ctr">
-                      <a:solidFill>
-                        <a:schemeClr val="tx1"/>
-                      </a:solidFill>
-                      <a:prstDash val="solid"/>
-                      <a:round/>
-                      <a:headEnd type="none" w="med" len="med"/>
-                      <a:tailEnd type="none" w="med" len="med"/>
-                    </a:lnR>
-                    <a:lnT w="12700" cap="flat" cmpd="sng" algn="ctr">
-                      <a:solidFill>
-                        <a:schemeClr val="tx1"/>
-                      </a:solidFill>
-                      <a:prstDash val="solid"/>
-                      <a:round/>
-                      <a:headEnd type="none" w="med" len="med"/>
-                      <a:tailEnd type="none" w="med" len="med"/>
-                    </a:lnT>
-                    <a:lnB w="12700" cap="flat" cmpd="sng" algn="ctr">
-                      <a:solidFill>
-                        <a:schemeClr val="tx1"/>
-                      </a:solidFill>
-                      <a:prstDash val="solid"/>
-                      <a:round/>
-                      <a:headEnd type="none" w="med" len="med"/>
-                      <a:tailEnd type="none" w="med" len="med"/>
-                    </a:lnB>
-                  </a:tcPr>
-                </a:tc>
-                <a:tc>
-                  <a:txBody>
-                    <a:bodyPr/>
-                    <a:lstStyle/>
-                    <a:p>
-                      <a:pPr algn="ctr"/>
-                      <a:endParaRPr lang="pt-PT"/>
-                    </a:p>
-                  </a:txBody>
-                  <a:tcPr>
-                    <a:lnL w="12700" cap="flat" cmpd="sng" algn="ctr">
-                      <a:solidFill>
-                        <a:schemeClr val="tx1"/>
-                      </a:solidFill>
-                      <a:prstDash val="solid"/>
-                      <a:round/>
-                      <a:headEnd type="none" w="med" len="med"/>
-                      <a:tailEnd type="none" w="med" len="med"/>
-                    </a:lnL>
-                    <a:lnR w="12700" cap="flat" cmpd="sng" algn="ctr">
-                      <a:solidFill>
-                        <a:schemeClr val="tx1"/>
-                      </a:solidFill>
-                      <a:prstDash val="solid"/>
-                      <a:round/>
-                      <a:headEnd type="none" w="med" len="med"/>
-                      <a:tailEnd type="none" w="med" len="med"/>
-                    </a:lnR>
-                    <a:lnT w="12700" cap="flat" cmpd="sng" algn="ctr">
-                      <a:solidFill>
-                        <a:schemeClr val="tx1"/>
-                      </a:solidFill>
-                      <a:prstDash val="solid"/>
-                      <a:round/>
-                      <a:headEnd type="none" w="med" len="med"/>
-                      <a:tailEnd type="none" w="med" len="med"/>
-                    </a:lnT>
-                    <a:lnB w="12700" cap="flat" cmpd="sng" algn="ctr">
-                      <a:solidFill>
-                        <a:schemeClr val="tx1"/>
-                      </a:solidFill>
-                      <a:prstDash val="solid"/>
-                      <a:round/>
-                      <a:headEnd type="none" w="med" len="med"/>
-                      <a:tailEnd type="none" w="med" len="med"/>
-                    </a:lnB>
-                  </a:tcPr>
-                </a:tc>
-                <a:tc>
-                  <a:txBody>
-                    <a:bodyPr/>
-                    <a:lstStyle/>
-                    <a:p>
-                      <a:pPr algn="ctr"/>
-                      <a:endParaRPr lang="pt-PT" dirty="0"/>
                     </a:p>
                   </a:txBody>
                   <a:tcPr>
@@ -23166,21 +23211,6 @@
 </file>
 
 <file path=customXml/item1.xml><?xml version="1.0" encoding="utf-8"?>
-<?mso-contentType ?>
-<FormTemplates xmlns="http://schemas.microsoft.com/sharepoint/v3/contenttype/forms">
-  <Display>DocumentLibraryForm</Display>
-  <Edit>DocumentLibraryForm</Edit>
-  <New>DocumentLibraryForm</New>
-</FormTemplates>
-</file>
-
-<file path=customXml/item2.xml><?xml version="1.0" encoding="utf-8"?>
-<p:properties xmlns:p="http://schemas.microsoft.com/office/2006/metadata/properties" xmlns:xsi="http://www.w3.org/2001/XMLSchema-instance" xmlns:pc="http://schemas.microsoft.com/office/infopath/2007/PartnerControls">
-  <documentManagement/>
-</p:properties>
-</file>
-
-<file path=customXml/item3.xml><?xml version="1.0" encoding="utf-8"?>
 <ct:contentTypeSchema xmlns:ct="http://schemas.microsoft.com/office/2006/metadata/contentType" xmlns:ma="http://schemas.microsoft.com/office/2006/metadata/properties/metaAttributes" ct:_="" ma:_="" ma:contentTypeName="Document" ma:contentTypeID="0x0101005836243B3C47804EAF5FFDD9F066FCC7" ma:contentTypeVersion="2" ma:contentTypeDescription="Create a new document." ma:contentTypeScope="" ma:versionID="0469372245184f18195408053fbf9b6d">
   <xsd:schema xmlns:xsd="http://www.w3.org/2001/XMLSchema" xmlns:xs="http://www.w3.org/2001/XMLSchema" xmlns:p="http://schemas.microsoft.com/office/2006/metadata/properties" xmlns:ns2="a1e3ca88-8ae5-4fd0-ba37-40ce669fcbb0" targetNamespace="http://schemas.microsoft.com/office/2006/metadata/properties" ma:root="true" ma:fieldsID="15cd5fdf54d7c5df31b4840e959455b1" ns2:_="">
     <xsd:import namespace="a1e3ca88-8ae5-4fd0-ba37-40ce669fcbb0"/>
@@ -23312,10 +23342,35 @@
 </ct:contentTypeSchema>
 </file>
 
+<file path=customXml/item2.xml><?xml version="1.0" encoding="utf-8"?>
+<p:properties xmlns:p="http://schemas.microsoft.com/office/2006/metadata/properties" xmlns:xsi="http://www.w3.org/2001/XMLSchema-instance" xmlns:pc="http://schemas.microsoft.com/office/infopath/2007/PartnerControls">
+  <documentManagement/>
+</p:properties>
+</file>
+
+<file path=customXml/item3.xml><?xml version="1.0" encoding="utf-8"?>
+<?mso-contentType ?>
+<FormTemplates xmlns="http://schemas.microsoft.com/sharepoint/v3/contenttype/forms">
+  <Display>DocumentLibraryForm</Display>
+  <Edit>DocumentLibraryForm</Edit>
+  <New>DocumentLibraryForm</New>
+</FormTemplates>
+</file>
+
 <file path=customXml/itemProps1.xml><?xml version="1.0" encoding="utf-8"?>
-<ds:datastoreItem xmlns:ds="http://schemas.openxmlformats.org/officeDocument/2006/customXml" ds:itemID="{4F984168-AABC-4753-B4EC-59CA9D08839F}">
+<ds:datastoreItem xmlns:ds="http://schemas.openxmlformats.org/officeDocument/2006/customXml" ds:itemID="{2092E48C-C6FF-44AE-8C78-D9681B66D30B}">
   <ds:schemaRefs>
-    <ds:schemaRef ds:uri="http://schemas.microsoft.com/sharepoint/v3/contenttype/forms"/>
+    <ds:schemaRef ds:uri="http://schemas.microsoft.com/office/2006/metadata/contentType"/>
+    <ds:schemaRef ds:uri="http://schemas.microsoft.com/office/2006/metadata/properties/metaAttributes"/>
+    <ds:schemaRef ds:uri="http://www.w3.org/2001/XMLSchema"/>
+    <ds:schemaRef ds:uri="http://schemas.microsoft.com/office/2006/metadata/properties"/>
+    <ds:schemaRef ds:uri="a1e3ca88-8ae5-4fd0-ba37-40ce669fcbb0"/>
+    <ds:schemaRef ds:uri="http://schemas.microsoft.com/office/2006/documentManagement/types"/>
+    <ds:schemaRef ds:uri="http://schemas.microsoft.com/office/infopath/2007/PartnerControls"/>
+    <ds:schemaRef ds:uri="http://schemas.openxmlformats.org/package/2006/metadata/core-properties"/>
+    <ds:schemaRef ds:uri="http://purl.org/dc/elements/1.1/"/>
+    <ds:schemaRef ds:uri="http://purl.org/dc/terms/"/>
+    <ds:schemaRef ds:uri="http://schemas.microsoft.com/internal/obd"/>
   </ds:schemaRefs>
 </ds:datastoreItem>
 </file>
@@ -23337,19 +23392,9 @@
 </file>
 
 <file path=customXml/itemProps3.xml><?xml version="1.0" encoding="utf-8"?>
-<ds:datastoreItem xmlns:ds="http://schemas.openxmlformats.org/officeDocument/2006/customXml" ds:itemID="{2092E48C-C6FF-44AE-8C78-D9681B66D30B}">
+<ds:datastoreItem xmlns:ds="http://schemas.openxmlformats.org/officeDocument/2006/customXml" ds:itemID="{4F984168-AABC-4753-B4EC-59CA9D08839F}">
   <ds:schemaRefs>
-    <ds:schemaRef ds:uri="http://schemas.microsoft.com/office/2006/metadata/contentType"/>
-    <ds:schemaRef ds:uri="http://schemas.microsoft.com/office/2006/metadata/properties/metaAttributes"/>
-    <ds:schemaRef ds:uri="http://www.w3.org/2001/XMLSchema"/>
-    <ds:schemaRef ds:uri="http://schemas.microsoft.com/office/2006/metadata/properties"/>
-    <ds:schemaRef ds:uri="a1e3ca88-8ae5-4fd0-ba37-40ce669fcbb0"/>
-    <ds:schemaRef ds:uri="http://schemas.microsoft.com/office/2006/documentManagement/types"/>
-    <ds:schemaRef ds:uri="http://schemas.microsoft.com/office/infopath/2007/PartnerControls"/>
-    <ds:schemaRef ds:uri="http://schemas.openxmlformats.org/package/2006/metadata/core-properties"/>
-    <ds:schemaRef ds:uri="http://purl.org/dc/elements/1.1/"/>
-    <ds:schemaRef ds:uri="http://purl.org/dc/terms/"/>
-    <ds:schemaRef ds:uri="http://schemas.microsoft.com/internal/obd"/>
+    <ds:schemaRef ds:uri="http://schemas.microsoft.com/sharepoint/v3/contenttype/forms"/>
   </ds:schemaRefs>
 </ds:datastoreItem>
 </file>
</xml_diff>